<commit_message>
update the system design section in the read me file.
</commit_message>
<xml_diff>
--- a/doc/designDoc.pptx
+++ b/doc/designDoc.pptx
@@ -6,6 +6,7 @@
   </p:sldMasterIdLst>
   <p:sldIdLst>
     <p:sldId id="259" r:id="rId2"/>
+    <p:sldId id="260" r:id="rId3"/>
   </p:sldIdLst>
   <p:sldSz cx="12192000" cy="6858000"/>
   <p:notesSz cx="6858000" cy="9144000"/>
@@ -261,7 +262,7 @@
           <a:p>
             <a:fld id="{CDC98657-0BC1-4190-9EED-34F8861D1841}" type="datetimeFigureOut">
               <a:rPr lang="en-SG" smtClean="0"/>
-              <a:t>18/12/2024</a:t>
+              <a:t>19/12/2024</a:t>
             </a:fld>
             <a:endParaRPr lang="en-SG"/>
           </a:p>
@@ -461,7 +462,7 @@
           <a:p>
             <a:fld id="{CDC98657-0BC1-4190-9EED-34F8861D1841}" type="datetimeFigureOut">
               <a:rPr lang="en-SG" smtClean="0"/>
-              <a:t>18/12/2024</a:t>
+              <a:t>19/12/2024</a:t>
             </a:fld>
             <a:endParaRPr lang="en-SG"/>
           </a:p>
@@ -671,7 +672,7 @@
           <a:p>
             <a:fld id="{CDC98657-0BC1-4190-9EED-34F8861D1841}" type="datetimeFigureOut">
               <a:rPr lang="en-SG" smtClean="0"/>
-              <a:t>18/12/2024</a:t>
+              <a:t>19/12/2024</a:t>
             </a:fld>
             <a:endParaRPr lang="en-SG"/>
           </a:p>
@@ -871,7 +872,7 @@
           <a:p>
             <a:fld id="{CDC98657-0BC1-4190-9EED-34F8861D1841}" type="datetimeFigureOut">
               <a:rPr lang="en-SG" smtClean="0"/>
-              <a:t>18/12/2024</a:t>
+              <a:t>19/12/2024</a:t>
             </a:fld>
             <a:endParaRPr lang="en-SG"/>
           </a:p>
@@ -1147,7 +1148,7 @@
           <a:p>
             <a:fld id="{CDC98657-0BC1-4190-9EED-34F8861D1841}" type="datetimeFigureOut">
               <a:rPr lang="en-SG" smtClean="0"/>
-              <a:t>18/12/2024</a:t>
+              <a:t>19/12/2024</a:t>
             </a:fld>
             <a:endParaRPr lang="en-SG"/>
           </a:p>
@@ -1415,7 +1416,7 @@
           <a:p>
             <a:fld id="{CDC98657-0BC1-4190-9EED-34F8861D1841}" type="datetimeFigureOut">
               <a:rPr lang="en-SG" smtClean="0"/>
-              <a:t>18/12/2024</a:t>
+              <a:t>19/12/2024</a:t>
             </a:fld>
             <a:endParaRPr lang="en-SG"/>
           </a:p>
@@ -1830,7 +1831,7 @@
           <a:p>
             <a:fld id="{CDC98657-0BC1-4190-9EED-34F8861D1841}" type="datetimeFigureOut">
               <a:rPr lang="en-SG" smtClean="0"/>
-              <a:t>18/12/2024</a:t>
+              <a:t>19/12/2024</a:t>
             </a:fld>
             <a:endParaRPr lang="en-SG"/>
           </a:p>
@@ -1972,7 +1973,7 @@
           <a:p>
             <a:fld id="{CDC98657-0BC1-4190-9EED-34F8861D1841}" type="datetimeFigureOut">
               <a:rPr lang="en-SG" smtClean="0"/>
-              <a:t>18/12/2024</a:t>
+              <a:t>19/12/2024</a:t>
             </a:fld>
             <a:endParaRPr lang="en-SG"/>
           </a:p>
@@ -2085,7 +2086,7 @@
           <a:p>
             <a:fld id="{CDC98657-0BC1-4190-9EED-34F8861D1841}" type="datetimeFigureOut">
               <a:rPr lang="en-SG" smtClean="0"/>
-              <a:t>18/12/2024</a:t>
+              <a:t>19/12/2024</a:t>
             </a:fld>
             <a:endParaRPr lang="en-SG"/>
           </a:p>
@@ -2398,7 +2399,7 @@
           <a:p>
             <a:fld id="{CDC98657-0BC1-4190-9EED-34F8861D1841}" type="datetimeFigureOut">
               <a:rPr lang="en-SG" smtClean="0"/>
-              <a:t>18/12/2024</a:t>
+              <a:t>19/12/2024</a:t>
             </a:fld>
             <a:endParaRPr lang="en-SG"/>
           </a:p>
@@ -2687,7 +2688,7 @@
           <a:p>
             <a:fld id="{CDC98657-0BC1-4190-9EED-34F8861D1841}" type="datetimeFigureOut">
               <a:rPr lang="en-SG" smtClean="0"/>
-              <a:t>18/12/2024</a:t>
+              <a:t>19/12/2024</a:t>
             </a:fld>
             <a:endParaRPr lang="en-SG"/>
           </a:p>
@@ -2930,7 +2931,7 @@
           <a:p>
             <a:fld id="{CDC98657-0BC1-4190-9EED-34F8861D1841}" type="datetimeFigureOut">
               <a:rPr lang="en-SG" smtClean="0"/>
-              <a:t>18/12/2024</a:t>
+              <a:t>19/12/2024</a:t>
             </a:fld>
             <a:endParaRPr lang="en-SG"/>
           </a:p>
@@ -5982,6 +5983,1917 @@
 </p:sld>
 </file>
 
+<file path=ppt/slides/slide2.xml><?xml version="1.0" encoding="utf-8"?>
+<p:sld xmlns:a="http://schemas.openxmlformats.org/drawingml/2006/main" xmlns:r="http://schemas.openxmlformats.org/officeDocument/2006/relationships" xmlns:p="http://schemas.openxmlformats.org/presentationml/2006/main">
+  <p:cSld>
+    <p:spTree>
+      <p:nvGrpSpPr>
+        <p:cNvPr id="1" name=""/>
+        <p:cNvGrpSpPr/>
+        <p:nvPr/>
+      </p:nvGrpSpPr>
+      <p:grpSpPr>
+        <a:xfrm>
+          <a:off x="0" y="0"/>
+          <a:ext cx="0" cy="0"/>
+          <a:chOff x="0" y="0"/>
+          <a:chExt cx="0" cy="0"/>
+        </a:xfrm>
+      </p:grpSpPr>
+      <p:sp>
+        <p:nvSpPr>
+          <p:cNvPr id="61" name="Rectangle 60">
+            <a:extLst>
+              <a:ext uri="{FF2B5EF4-FFF2-40B4-BE49-F238E27FC236}">
+                <a16:creationId xmlns:a16="http://schemas.microsoft.com/office/drawing/2014/main" id="{E26861FD-EEA2-5CF8-ECFF-374D80D13AFA}"/>
+              </a:ext>
+            </a:extLst>
+          </p:cNvPr>
+          <p:cNvSpPr/>
+          <p:nvPr/>
+        </p:nvSpPr>
+        <p:spPr>
+          <a:xfrm>
+            <a:off x="7400169" y="1711397"/>
+            <a:ext cx="1892112" cy="1888796"/>
+          </a:xfrm>
+          <a:prstGeom prst="rect">
+            <a:avLst/>
+          </a:prstGeom>
+          <a:solidFill>
+            <a:schemeClr val="bg1"/>
+          </a:solidFill>
+          <a:ln w="19050">
+            <a:prstDash val="sysDash"/>
+          </a:ln>
+        </p:spPr>
+        <p:style>
+          <a:lnRef idx="2">
+            <a:schemeClr val="accent1">
+              <a:shade val="15000"/>
+            </a:schemeClr>
+          </a:lnRef>
+          <a:fillRef idx="1">
+            <a:schemeClr val="accent1"/>
+          </a:fillRef>
+          <a:effectRef idx="0">
+            <a:schemeClr val="accent1"/>
+          </a:effectRef>
+          <a:fontRef idx="minor">
+            <a:schemeClr val="lt1"/>
+          </a:fontRef>
+        </p:style>
+        <p:txBody>
+          <a:bodyPr rtlCol="0" anchor="ctr"/>
+          <a:lstStyle/>
+          <a:p>
+            <a:pPr algn="ctr"/>
+            <a:endParaRPr lang="en-SG" dirty="0"/>
+          </a:p>
+        </p:txBody>
+      </p:sp>
+      <p:sp>
+        <p:nvSpPr>
+          <p:cNvPr id="4" name="Rectangle 3">
+            <a:extLst>
+              <a:ext uri="{FF2B5EF4-FFF2-40B4-BE49-F238E27FC236}">
+                <a16:creationId xmlns:a16="http://schemas.microsoft.com/office/drawing/2014/main" id="{8B48F4DD-FA76-1F45-5099-31B14797EC5F}"/>
+              </a:ext>
+            </a:extLst>
+          </p:cNvPr>
+          <p:cNvSpPr/>
+          <p:nvPr/>
+        </p:nvSpPr>
+        <p:spPr>
+          <a:xfrm>
+            <a:off x="3055432" y="1694461"/>
+            <a:ext cx="4137104" cy="4087709"/>
+          </a:xfrm>
+          <a:prstGeom prst="rect">
+            <a:avLst/>
+          </a:prstGeom>
+          <a:solidFill>
+            <a:schemeClr val="bg1"/>
+          </a:solidFill>
+          <a:ln w="19050">
+            <a:prstDash val="sysDash"/>
+          </a:ln>
+        </p:spPr>
+        <p:style>
+          <a:lnRef idx="2">
+            <a:schemeClr val="accent1">
+              <a:shade val="15000"/>
+            </a:schemeClr>
+          </a:lnRef>
+          <a:fillRef idx="1">
+            <a:schemeClr val="accent1"/>
+          </a:fillRef>
+          <a:effectRef idx="0">
+            <a:schemeClr val="accent1"/>
+          </a:effectRef>
+          <a:fontRef idx="minor">
+            <a:schemeClr val="lt1"/>
+          </a:fontRef>
+        </p:style>
+        <p:txBody>
+          <a:bodyPr rtlCol="0" anchor="ctr"/>
+          <a:lstStyle/>
+          <a:p>
+            <a:pPr algn="ctr"/>
+            <a:endParaRPr lang="en-SG" dirty="0"/>
+          </a:p>
+        </p:txBody>
+      </p:sp>
+      <p:sp>
+        <p:nvSpPr>
+          <p:cNvPr id="5" name="TextBox 4">
+            <a:extLst>
+              <a:ext uri="{FF2B5EF4-FFF2-40B4-BE49-F238E27FC236}">
+                <a16:creationId xmlns:a16="http://schemas.microsoft.com/office/drawing/2014/main" id="{407F747C-4B6F-70ED-65F3-EB4B0AF7284C}"/>
+              </a:ext>
+            </a:extLst>
+          </p:cNvPr>
+          <p:cNvSpPr txBox="1"/>
+          <p:nvPr/>
+        </p:nvSpPr>
+        <p:spPr>
+          <a:xfrm>
+            <a:off x="1726289" y="877406"/>
+            <a:ext cx="7048309" cy="400110"/>
+          </a:xfrm>
+          <a:prstGeom prst="rect">
+            <a:avLst/>
+          </a:prstGeom>
+          <a:noFill/>
+          <a:ln w="19050">
+            <a:solidFill>
+              <a:schemeClr val="tx1"/>
+            </a:solidFill>
+          </a:ln>
+        </p:spPr>
+        <p:txBody>
+          <a:bodyPr wrap="square" rtlCol="0">
+            <a:spAutoFit/>
+          </a:bodyPr>
+          <a:lstStyle/>
+          <a:p>
+            <a:r>
+              <a:rPr kumimoji="0" lang="en-US" altLang="zh-CN" sz="2000" b="1" i="0" u="none" strike="noStrike" kern="1200" cap="none" spc="0" normalizeH="0" baseline="0" noProof="0" dirty="0">
+                <a:ln>
+                  <a:noFill/>
+                </a:ln>
+                <a:solidFill>
+                  <a:prstClr val="black"/>
+                </a:solidFill>
+                <a:effectLst/>
+                <a:uLnTx/>
+                <a:uFillTx/>
+                <a:ea typeface="等线" panose="02010600030101010101" pitchFamily="2" charset="-122"/>
+                <a:cs typeface="+mn-cs"/>
+              </a:rPr>
+              <a:t>P2P Communication</a:t>
+            </a:r>
+            <a:r>
+              <a:rPr lang="en-US" altLang="zh-CN" sz="2000" b="1" dirty="0">
+                <a:solidFill>
+                  <a:prstClr val="black"/>
+                </a:solidFill>
+                <a:ea typeface="等线" panose="02010600030101010101" pitchFamily="2" charset="-122"/>
+              </a:rPr>
+              <a:t> </a:t>
+            </a:r>
+            <a:r>
+              <a:rPr kumimoji="0" lang="en-US" altLang="zh-CN" sz="2000" b="1" i="0" u="none" strike="noStrike" kern="1200" cap="none" spc="0" normalizeH="0" baseline="0" noProof="0" dirty="0">
+                <a:ln>
+                  <a:noFill/>
+                </a:ln>
+                <a:solidFill>
+                  <a:prstClr val="black"/>
+                </a:solidFill>
+                <a:effectLst/>
+                <a:uLnTx/>
+                <a:uFillTx/>
+                <a:ea typeface="等线" panose="02010600030101010101" pitchFamily="2" charset="-122"/>
+                <a:cs typeface="+mn-cs"/>
+              </a:rPr>
+              <a:t>Geolocation Topology Map</a:t>
+            </a:r>
+            <a:r>
+              <a:rPr lang="en-US" altLang="zh-CN" sz="2000" b="1" dirty="0">
+                <a:solidFill>
+                  <a:prstClr val="black"/>
+                </a:solidFill>
+                <a:ea typeface="等线" panose="02010600030101010101" pitchFamily="2" charset="-122"/>
+              </a:rPr>
+              <a:t> </a:t>
+            </a:r>
+            <a:r>
+              <a:rPr kumimoji="0" lang="en-US" altLang="zh-CN" sz="2000" b="1" i="0" u="none" strike="noStrike" kern="1200" cap="none" spc="0" normalizeH="0" baseline="0" noProof="0" dirty="0">
+                <a:ln>
+                  <a:noFill/>
+                </a:ln>
+                <a:solidFill>
+                  <a:prstClr val="black"/>
+                </a:solidFill>
+                <a:effectLst/>
+                <a:uLnTx/>
+                <a:uFillTx/>
+                <a:ea typeface="等线" panose="02010600030101010101" pitchFamily="2" charset="-122"/>
+                <a:cs typeface="+mn-cs"/>
+              </a:rPr>
+              <a:t>Plugin Workflow</a:t>
+            </a:r>
+            <a:endParaRPr lang="en-SG" sz="2000" b="1" dirty="0"/>
+          </a:p>
+        </p:txBody>
+      </p:sp>
+      <p:pic>
+        <p:nvPicPr>
+          <p:cNvPr id="6" name="Picture 2">
+            <a:extLst>
+              <a:ext uri="{FF2B5EF4-FFF2-40B4-BE49-F238E27FC236}">
+                <a16:creationId xmlns:a16="http://schemas.microsoft.com/office/drawing/2014/main" id="{CC60DF5C-8BB4-C709-F22A-28F0B85E8332}"/>
+              </a:ext>
+            </a:extLst>
+          </p:cNvPr>
+          <p:cNvPicPr>
+            <a:picLocks noChangeAspect="1" noChangeArrowheads="1"/>
+          </p:cNvPicPr>
+          <p:nvPr/>
+        </p:nvPicPr>
+        <p:blipFill>
+          <a:blip r:embed="rId2">
+            <a:extLst>
+              <a:ext uri="{28A0092B-C50C-407E-A947-70E740481C1C}">
+                <a14:useLocalDpi xmlns:a14="http://schemas.microsoft.com/office/drawing/2010/main" val="0"/>
+              </a:ext>
+            </a:extLst>
+          </a:blip>
+          <a:srcRect/>
+          <a:stretch>
+            <a:fillRect/>
+          </a:stretch>
+        </p:blipFill>
+        <p:spPr bwMode="auto">
+          <a:xfrm>
+            <a:off x="1849340" y="3008955"/>
+            <a:ext cx="675174" cy="675174"/>
+          </a:xfrm>
+          <a:prstGeom prst="rect">
+            <a:avLst/>
+          </a:prstGeom>
+          <a:noFill/>
+          <a:extLst>
+            <a:ext uri="{909E8E84-426E-40DD-AFC4-6F175D3DCCD1}">
+              <a14:hiddenFill xmlns:a14="http://schemas.microsoft.com/office/drawing/2010/main">
+                <a:solidFill>
+                  <a:srgbClr val="FFFFFF"/>
+                </a:solidFill>
+              </a14:hiddenFill>
+            </a:ext>
+          </a:extLst>
+        </p:spPr>
+      </p:pic>
+      <p:sp>
+        <p:nvSpPr>
+          <p:cNvPr id="7" name="TextBox 6">
+            <a:extLst>
+              <a:ext uri="{FF2B5EF4-FFF2-40B4-BE49-F238E27FC236}">
+                <a16:creationId xmlns:a16="http://schemas.microsoft.com/office/drawing/2014/main" id="{D4BC321F-FE84-44F8-BB64-45539477D0A9}"/>
+              </a:ext>
+            </a:extLst>
+          </p:cNvPr>
+          <p:cNvSpPr txBox="1"/>
+          <p:nvPr/>
+        </p:nvSpPr>
+        <p:spPr>
+          <a:xfrm>
+            <a:off x="5019424" y="1734828"/>
+            <a:ext cx="2161962" cy="338554"/>
+          </a:xfrm>
+          <a:prstGeom prst="rect">
+            <a:avLst/>
+          </a:prstGeom>
+          <a:noFill/>
+        </p:spPr>
+        <p:txBody>
+          <a:bodyPr wrap="square" rtlCol="0">
+            <a:spAutoFit/>
+          </a:bodyPr>
+          <a:lstStyle/>
+          <a:p>
+            <a:r>
+              <a:rPr lang="en-US" altLang="zh-CN" sz="1600" b="1" dirty="0"/>
+              <a:t>p2pCommMapApp.py</a:t>
+            </a:r>
+            <a:endParaRPr lang="zh-CN" altLang="en-US" sz="1600" b="1" dirty="0"/>
+          </a:p>
+        </p:txBody>
+      </p:sp>
+      <p:sp>
+        <p:nvSpPr>
+          <p:cNvPr id="8" name="Rectangle 7">
+            <a:extLst>
+              <a:ext uri="{FF2B5EF4-FFF2-40B4-BE49-F238E27FC236}">
+                <a16:creationId xmlns:a16="http://schemas.microsoft.com/office/drawing/2014/main" id="{C7E65C7B-4C5B-6F9D-072E-0C0947558455}"/>
+              </a:ext>
+            </a:extLst>
+          </p:cNvPr>
+          <p:cNvSpPr/>
+          <p:nvPr/>
+        </p:nvSpPr>
+        <p:spPr>
+          <a:xfrm>
+            <a:off x="3382332" y="1862660"/>
+            <a:ext cx="1209900" cy="338554"/>
+          </a:xfrm>
+          <a:prstGeom prst="rect">
+            <a:avLst/>
+          </a:prstGeom>
+          <a:solidFill>
+            <a:schemeClr val="accent6">
+              <a:lumMod val="75000"/>
+            </a:schemeClr>
+          </a:solidFill>
+        </p:spPr>
+        <p:style>
+          <a:lnRef idx="2">
+            <a:schemeClr val="accent1">
+              <a:shade val="50000"/>
+            </a:schemeClr>
+          </a:lnRef>
+          <a:fillRef idx="1">
+            <a:schemeClr val="accent1"/>
+          </a:fillRef>
+          <a:effectRef idx="0">
+            <a:schemeClr val="accent1"/>
+          </a:effectRef>
+          <a:fontRef idx="minor">
+            <a:schemeClr val="lt1"/>
+          </a:fontRef>
+        </p:style>
+        <p:txBody>
+          <a:bodyPr rtlCol="0" anchor="ctr"/>
+          <a:lstStyle/>
+          <a:p>
+            <a:r>
+              <a:rPr lang="en-US" altLang="zh-CN" sz="1400" dirty="0"/>
+              <a:t>Program </a:t>
+            </a:r>
+            <a:r>
+              <a:rPr lang="en-US" altLang="zh-CN" sz="1400" dirty="0" err="1"/>
+              <a:t>init</a:t>
+            </a:r>
+            <a:endParaRPr lang="zh-CN" altLang="en-US" sz="1400" dirty="0"/>
+          </a:p>
+        </p:txBody>
+      </p:sp>
+      <p:cxnSp>
+        <p:nvCxnSpPr>
+          <p:cNvPr id="9" name="直接箭头连接符 4">
+            <a:extLst>
+              <a:ext uri="{FF2B5EF4-FFF2-40B4-BE49-F238E27FC236}">
+                <a16:creationId xmlns:a16="http://schemas.microsoft.com/office/drawing/2014/main" id="{EA4B53B2-B445-4173-669B-5FCD04B1CA6D}"/>
+              </a:ext>
+            </a:extLst>
+          </p:cNvPr>
+          <p:cNvCxnSpPr/>
+          <p:nvPr/>
+        </p:nvCxnSpPr>
+        <p:spPr>
+          <a:xfrm>
+            <a:off x="3909223" y="2201214"/>
+            <a:ext cx="0" cy="504056"/>
+          </a:xfrm>
+          <a:prstGeom prst="straightConnector1">
+            <a:avLst/>
+          </a:prstGeom>
+          <a:ln w="19050">
+            <a:tailEnd type="arrow"/>
+          </a:ln>
+        </p:spPr>
+        <p:style>
+          <a:lnRef idx="1">
+            <a:schemeClr val="accent1"/>
+          </a:lnRef>
+          <a:fillRef idx="0">
+            <a:schemeClr val="accent1"/>
+          </a:fillRef>
+          <a:effectRef idx="0">
+            <a:schemeClr val="accent1"/>
+          </a:effectRef>
+          <a:fontRef idx="minor">
+            <a:schemeClr val="tx1"/>
+          </a:fontRef>
+        </p:style>
+      </p:cxnSp>
+      <p:sp>
+        <p:nvSpPr>
+          <p:cNvPr id="10" name="Rectangle 9">
+            <a:extLst>
+              <a:ext uri="{FF2B5EF4-FFF2-40B4-BE49-F238E27FC236}">
+                <a16:creationId xmlns:a16="http://schemas.microsoft.com/office/drawing/2014/main" id="{5B19265B-AE4D-02BC-B0A9-8C00D3DA2ED4}"/>
+              </a:ext>
+            </a:extLst>
+          </p:cNvPr>
+          <p:cNvSpPr/>
+          <p:nvPr/>
+        </p:nvSpPr>
+        <p:spPr>
+          <a:xfrm>
+            <a:off x="3382332" y="2705270"/>
+            <a:ext cx="1602262" cy="338554"/>
+          </a:xfrm>
+          <a:prstGeom prst="rect">
+            <a:avLst/>
+          </a:prstGeom>
+          <a:solidFill>
+            <a:schemeClr val="accent6">
+              <a:lumMod val="75000"/>
+            </a:schemeClr>
+          </a:solidFill>
+        </p:spPr>
+        <p:style>
+          <a:lnRef idx="2">
+            <a:schemeClr val="accent1">
+              <a:shade val="50000"/>
+            </a:schemeClr>
+          </a:lnRef>
+          <a:fillRef idx="1">
+            <a:schemeClr val="accent1"/>
+          </a:fillRef>
+          <a:effectRef idx="0">
+            <a:schemeClr val="accent1"/>
+          </a:effectRef>
+          <a:fontRef idx="minor">
+            <a:schemeClr val="lt1"/>
+          </a:fontRef>
+        </p:style>
+        <p:txBody>
+          <a:bodyPr rtlCol="0" anchor="ctr"/>
+          <a:lstStyle/>
+          <a:p>
+            <a:r>
+              <a:rPr lang="en-US" altLang="zh-CN" sz="1400" dirty="0"/>
+              <a:t>Load Configuration </a:t>
+            </a:r>
+            <a:endParaRPr lang="zh-CN" altLang="en-US" sz="1400" dirty="0"/>
+          </a:p>
+        </p:txBody>
+      </p:sp>
+      <p:sp>
+        <p:nvSpPr>
+          <p:cNvPr id="11" name="TextBox 10">
+            <a:extLst>
+              <a:ext uri="{FF2B5EF4-FFF2-40B4-BE49-F238E27FC236}">
+                <a16:creationId xmlns:a16="http://schemas.microsoft.com/office/drawing/2014/main" id="{C59693D2-C81E-BD25-3946-8473788D62B8}"/>
+              </a:ext>
+            </a:extLst>
+          </p:cNvPr>
+          <p:cNvSpPr txBox="1"/>
+          <p:nvPr/>
+        </p:nvSpPr>
+        <p:spPr>
+          <a:xfrm>
+            <a:off x="3934020" y="2294310"/>
+            <a:ext cx="1316424" cy="276999"/>
+          </a:xfrm>
+          <a:prstGeom prst="rect">
+            <a:avLst/>
+          </a:prstGeom>
+          <a:noFill/>
+        </p:spPr>
+        <p:txBody>
+          <a:bodyPr wrap="square" rtlCol="0">
+            <a:spAutoFit/>
+          </a:bodyPr>
+          <a:lstStyle/>
+          <a:p>
+            <a:r>
+              <a:rPr lang="en-SG" sz="1200" b="1" dirty="0">
+                <a:solidFill>
+                  <a:schemeClr val="accent6">
+                    <a:lumMod val="75000"/>
+                  </a:schemeClr>
+                </a:solidFill>
+              </a:rPr>
+              <a:t>Main thread</a:t>
+            </a:r>
+          </a:p>
+        </p:txBody>
+      </p:sp>
+      <p:cxnSp>
+        <p:nvCxnSpPr>
+          <p:cNvPr id="12" name="直接箭头连接符 4">
+            <a:extLst>
+              <a:ext uri="{FF2B5EF4-FFF2-40B4-BE49-F238E27FC236}">
+                <a16:creationId xmlns:a16="http://schemas.microsoft.com/office/drawing/2014/main" id="{207DA9D6-CEB1-6A07-7D9F-FC9EB0B0E9AA}"/>
+              </a:ext>
+            </a:extLst>
+          </p:cNvPr>
+          <p:cNvCxnSpPr>
+            <a:cxnSpLocks/>
+          </p:cNvCxnSpPr>
+          <p:nvPr/>
+        </p:nvCxnSpPr>
+        <p:spPr>
+          <a:xfrm>
+            <a:off x="3921621" y="3043824"/>
+            <a:ext cx="0" cy="1442984"/>
+          </a:xfrm>
+          <a:prstGeom prst="straightConnector1">
+            <a:avLst/>
+          </a:prstGeom>
+          <a:ln w="19050">
+            <a:tailEnd type="arrow"/>
+          </a:ln>
+        </p:spPr>
+        <p:style>
+          <a:lnRef idx="1">
+            <a:schemeClr val="accent1"/>
+          </a:lnRef>
+          <a:fillRef idx="0">
+            <a:schemeClr val="accent1"/>
+          </a:fillRef>
+          <a:effectRef idx="0">
+            <a:schemeClr val="accent1"/>
+          </a:effectRef>
+          <a:fontRef idx="minor">
+            <a:schemeClr val="tx1"/>
+          </a:fontRef>
+        </p:style>
+      </p:cxnSp>
+      <p:sp>
+        <p:nvSpPr>
+          <p:cNvPr id="15" name="Rectangle 14">
+            <a:extLst>
+              <a:ext uri="{FF2B5EF4-FFF2-40B4-BE49-F238E27FC236}">
+                <a16:creationId xmlns:a16="http://schemas.microsoft.com/office/drawing/2014/main" id="{861D899D-16B1-8AB1-6123-9593BA497DF0}"/>
+              </a:ext>
+            </a:extLst>
+          </p:cNvPr>
+          <p:cNvSpPr/>
+          <p:nvPr/>
+        </p:nvSpPr>
+        <p:spPr>
+          <a:xfrm>
+            <a:off x="3262413" y="4540342"/>
+            <a:ext cx="1209900" cy="444699"/>
+          </a:xfrm>
+          <a:prstGeom prst="rect">
+            <a:avLst/>
+          </a:prstGeom>
+          <a:solidFill>
+            <a:schemeClr val="accent6">
+              <a:lumMod val="75000"/>
+            </a:schemeClr>
+          </a:solidFill>
+        </p:spPr>
+        <p:style>
+          <a:lnRef idx="2">
+            <a:schemeClr val="accent1">
+              <a:shade val="50000"/>
+            </a:schemeClr>
+          </a:lnRef>
+          <a:fillRef idx="1">
+            <a:schemeClr val="accent1"/>
+          </a:fillRef>
+          <a:effectRef idx="0">
+            <a:schemeClr val="accent1"/>
+          </a:effectRef>
+          <a:fontRef idx="minor">
+            <a:schemeClr val="lt1"/>
+          </a:fontRef>
+        </p:style>
+        <p:txBody>
+          <a:bodyPr rtlCol="0" anchor="ctr"/>
+          <a:lstStyle/>
+          <a:p>
+            <a:r>
+              <a:rPr lang="en-US" altLang="zh-CN" sz="1400" dirty="0"/>
+              <a:t>Flask Web Host App</a:t>
+            </a:r>
+            <a:endParaRPr lang="zh-CN" altLang="en-US" sz="1400" dirty="0"/>
+          </a:p>
+        </p:txBody>
+      </p:sp>
+      <p:cxnSp>
+        <p:nvCxnSpPr>
+          <p:cNvPr id="16" name="直接箭头连接符 63">
+            <a:extLst>
+              <a:ext uri="{FF2B5EF4-FFF2-40B4-BE49-F238E27FC236}">
+                <a16:creationId xmlns:a16="http://schemas.microsoft.com/office/drawing/2014/main" id="{2FF274BE-081A-971D-ED39-5C82B29C0740}"/>
+              </a:ext>
+            </a:extLst>
+          </p:cNvPr>
+          <p:cNvCxnSpPr>
+            <a:cxnSpLocks/>
+          </p:cNvCxnSpPr>
+          <p:nvPr/>
+        </p:nvCxnSpPr>
+        <p:spPr>
+          <a:xfrm>
+            <a:off x="3966125" y="3400077"/>
+            <a:ext cx="1680109" cy="0"/>
+          </a:xfrm>
+          <a:prstGeom prst="straightConnector1">
+            <a:avLst/>
+          </a:prstGeom>
+          <a:ln w="19050">
+            <a:tailEnd type="arrow"/>
+          </a:ln>
+        </p:spPr>
+        <p:style>
+          <a:lnRef idx="1">
+            <a:schemeClr val="accent1"/>
+          </a:lnRef>
+          <a:fillRef idx="0">
+            <a:schemeClr val="accent1"/>
+          </a:fillRef>
+          <a:effectRef idx="0">
+            <a:schemeClr val="accent1"/>
+          </a:effectRef>
+          <a:fontRef idx="minor">
+            <a:schemeClr val="tx1"/>
+          </a:fontRef>
+        </p:style>
+      </p:cxnSp>
+      <p:sp>
+        <p:nvSpPr>
+          <p:cNvPr id="17" name="Rectangle 16">
+            <a:extLst>
+              <a:ext uri="{FF2B5EF4-FFF2-40B4-BE49-F238E27FC236}">
+                <a16:creationId xmlns:a16="http://schemas.microsoft.com/office/drawing/2014/main" id="{6C13710A-DC17-52CA-C703-22BA1FE46381}"/>
+              </a:ext>
+            </a:extLst>
+          </p:cNvPr>
+          <p:cNvSpPr/>
+          <p:nvPr/>
+        </p:nvSpPr>
+        <p:spPr>
+          <a:xfrm>
+            <a:off x="5658632" y="3221736"/>
+            <a:ext cx="1271443" cy="338554"/>
+          </a:xfrm>
+          <a:prstGeom prst="rect">
+            <a:avLst/>
+          </a:prstGeom>
+          <a:solidFill>
+            <a:schemeClr val="accent6">
+              <a:lumMod val="75000"/>
+            </a:schemeClr>
+          </a:solidFill>
+        </p:spPr>
+        <p:style>
+          <a:lnRef idx="2">
+            <a:schemeClr val="accent1">
+              <a:shade val="50000"/>
+            </a:schemeClr>
+          </a:lnRef>
+          <a:fillRef idx="1">
+            <a:schemeClr val="accent1"/>
+          </a:fillRef>
+          <a:effectRef idx="0">
+            <a:schemeClr val="accent1"/>
+          </a:effectRef>
+          <a:fontRef idx="minor">
+            <a:schemeClr val="lt1"/>
+          </a:fontRef>
+        </p:style>
+        <p:txBody>
+          <a:bodyPr rtlCol="0" anchor="ctr"/>
+          <a:lstStyle/>
+          <a:p>
+            <a:r>
+              <a:rPr lang="en-US" altLang="zh-CN" sz="1400" dirty="0"/>
+              <a:t>Data Manager</a:t>
+            </a:r>
+            <a:endParaRPr lang="zh-CN" altLang="en-US" sz="1400" dirty="0"/>
+          </a:p>
+        </p:txBody>
+      </p:sp>
+      <p:sp>
+        <p:nvSpPr>
+          <p:cNvPr id="19" name="TextBox 18">
+            <a:extLst>
+              <a:ext uri="{FF2B5EF4-FFF2-40B4-BE49-F238E27FC236}">
+                <a16:creationId xmlns:a16="http://schemas.microsoft.com/office/drawing/2014/main" id="{9B2BCEDB-5F4D-FCD8-E188-268DF55EF2FB}"/>
+              </a:ext>
+            </a:extLst>
+          </p:cNvPr>
+          <p:cNvSpPr txBox="1"/>
+          <p:nvPr/>
+        </p:nvSpPr>
+        <p:spPr>
+          <a:xfrm>
+            <a:off x="3934020" y="3069543"/>
+            <a:ext cx="1712214" cy="276999"/>
+          </a:xfrm>
+          <a:prstGeom prst="rect">
+            <a:avLst/>
+          </a:prstGeom>
+          <a:noFill/>
+        </p:spPr>
+        <p:txBody>
+          <a:bodyPr wrap="square" rtlCol="0">
+            <a:spAutoFit/>
+          </a:bodyPr>
+          <a:lstStyle/>
+          <a:p>
+            <a:r>
+              <a:rPr lang="en-SG" sz="1200" b="1" dirty="0">
+                <a:solidFill>
+                  <a:schemeClr val="accent6">
+                    <a:lumMod val="75000"/>
+                  </a:schemeClr>
+                </a:solidFill>
+              </a:rPr>
+              <a:t>Data Processing thread</a:t>
+            </a:r>
+          </a:p>
+        </p:txBody>
+      </p:sp>
+      <p:cxnSp>
+        <p:nvCxnSpPr>
+          <p:cNvPr id="21" name="直接箭头连接符 63">
+            <a:extLst>
+              <a:ext uri="{FF2B5EF4-FFF2-40B4-BE49-F238E27FC236}">
+                <a16:creationId xmlns:a16="http://schemas.microsoft.com/office/drawing/2014/main" id="{ACED7660-A5AA-09FA-7AF8-C78E5C9494A5}"/>
+              </a:ext>
+            </a:extLst>
+          </p:cNvPr>
+          <p:cNvCxnSpPr>
+            <a:cxnSpLocks/>
+          </p:cNvCxnSpPr>
+          <p:nvPr/>
+        </p:nvCxnSpPr>
+        <p:spPr>
+          <a:xfrm>
+            <a:off x="6192652" y="3577016"/>
+            <a:ext cx="0" cy="337588"/>
+          </a:xfrm>
+          <a:prstGeom prst="straightConnector1">
+            <a:avLst/>
+          </a:prstGeom>
+          <a:ln w="19050">
+            <a:tailEnd type="arrow"/>
+          </a:ln>
+        </p:spPr>
+        <p:style>
+          <a:lnRef idx="1">
+            <a:schemeClr val="accent1"/>
+          </a:lnRef>
+          <a:fillRef idx="0">
+            <a:schemeClr val="accent1"/>
+          </a:fillRef>
+          <a:effectRef idx="0">
+            <a:schemeClr val="accent1"/>
+          </a:effectRef>
+          <a:fontRef idx="minor">
+            <a:schemeClr val="tx1"/>
+          </a:fontRef>
+        </p:style>
+      </p:cxnSp>
+      <p:sp>
+        <p:nvSpPr>
+          <p:cNvPr id="24" name="Rectangle 23">
+            <a:extLst>
+              <a:ext uri="{FF2B5EF4-FFF2-40B4-BE49-F238E27FC236}">
+                <a16:creationId xmlns:a16="http://schemas.microsoft.com/office/drawing/2014/main" id="{52EDC264-239C-164F-59DF-077A3219B9E1}"/>
+              </a:ext>
+            </a:extLst>
+          </p:cNvPr>
+          <p:cNvSpPr/>
+          <p:nvPr/>
+        </p:nvSpPr>
+        <p:spPr>
+          <a:xfrm>
+            <a:off x="5250444" y="3910944"/>
+            <a:ext cx="1842376" cy="335743"/>
+          </a:xfrm>
+          <a:prstGeom prst="rect">
+            <a:avLst/>
+          </a:prstGeom>
+          <a:solidFill>
+            <a:schemeClr val="accent6">
+              <a:lumMod val="75000"/>
+            </a:schemeClr>
+          </a:solidFill>
+        </p:spPr>
+        <p:style>
+          <a:lnRef idx="2">
+            <a:schemeClr val="accent1">
+              <a:shade val="50000"/>
+            </a:schemeClr>
+          </a:lnRef>
+          <a:fillRef idx="1">
+            <a:schemeClr val="accent1"/>
+          </a:fillRef>
+          <a:effectRef idx="0">
+            <a:schemeClr val="accent1"/>
+          </a:effectRef>
+          <a:fontRef idx="minor">
+            <a:schemeClr val="lt1"/>
+          </a:fontRef>
+        </p:style>
+        <p:txBody>
+          <a:bodyPr rtlCol="0" anchor="ctr"/>
+          <a:lstStyle/>
+          <a:p>
+            <a:r>
+              <a:rPr lang="en-US" altLang="zh-CN" sz="1400" dirty="0"/>
+              <a:t>DB Data Fetch Module</a:t>
+            </a:r>
+            <a:endParaRPr lang="zh-CN" altLang="en-US" sz="1400" dirty="0"/>
+          </a:p>
+        </p:txBody>
+      </p:sp>
+      <p:sp>
+        <p:nvSpPr>
+          <p:cNvPr id="26" name="Rectangle 25">
+            <a:extLst>
+              <a:ext uri="{FF2B5EF4-FFF2-40B4-BE49-F238E27FC236}">
+                <a16:creationId xmlns:a16="http://schemas.microsoft.com/office/drawing/2014/main" id="{14670122-993C-1B3E-BD4E-655F0208A4F3}"/>
+              </a:ext>
+            </a:extLst>
+          </p:cNvPr>
+          <p:cNvSpPr/>
+          <p:nvPr/>
+        </p:nvSpPr>
+        <p:spPr>
+          <a:xfrm>
+            <a:off x="5140312" y="4550121"/>
+            <a:ext cx="1767390" cy="335743"/>
+          </a:xfrm>
+          <a:prstGeom prst="rect">
+            <a:avLst/>
+          </a:prstGeom>
+          <a:solidFill>
+            <a:schemeClr val="accent6">
+              <a:lumMod val="75000"/>
+            </a:schemeClr>
+          </a:solidFill>
+        </p:spPr>
+        <p:style>
+          <a:lnRef idx="2">
+            <a:schemeClr val="accent1">
+              <a:shade val="50000"/>
+            </a:schemeClr>
+          </a:lnRef>
+          <a:fillRef idx="1">
+            <a:schemeClr val="accent1"/>
+          </a:fillRef>
+          <a:effectRef idx="0">
+            <a:schemeClr val="accent1"/>
+          </a:effectRef>
+          <a:fontRef idx="minor">
+            <a:schemeClr val="lt1"/>
+          </a:fontRef>
+        </p:style>
+        <p:txBody>
+          <a:bodyPr rtlCol="0" anchor="ctr"/>
+          <a:lstStyle/>
+          <a:p>
+            <a:r>
+              <a:rPr lang="en-US" altLang="zh-CN" sz="1400" dirty="0"/>
+              <a:t>Data Process Module</a:t>
+            </a:r>
+            <a:endParaRPr lang="zh-CN" altLang="en-US" sz="1400" dirty="0"/>
+          </a:p>
+        </p:txBody>
+      </p:sp>
+      <p:cxnSp>
+        <p:nvCxnSpPr>
+          <p:cNvPr id="27" name="直接箭头连接符 100">
+            <a:extLst>
+              <a:ext uri="{FF2B5EF4-FFF2-40B4-BE49-F238E27FC236}">
+                <a16:creationId xmlns:a16="http://schemas.microsoft.com/office/drawing/2014/main" id="{0347FCE6-94D0-EAAA-F633-321974AB2CAC}"/>
+              </a:ext>
+            </a:extLst>
+          </p:cNvPr>
+          <p:cNvCxnSpPr>
+            <a:cxnSpLocks/>
+          </p:cNvCxnSpPr>
+          <p:nvPr/>
+        </p:nvCxnSpPr>
+        <p:spPr>
+          <a:xfrm flipH="1">
+            <a:off x="4509695" y="4729144"/>
+            <a:ext cx="550810" cy="0"/>
+          </a:xfrm>
+          <a:prstGeom prst="straightConnector1">
+            <a:avLst/>
+          </a:prstGeom>
+          <a:ln w="19050">
+            <a:tailEnd type="arrow"/>
+          </a:ln>
+        </p:spPr>
+        <p:style>
+          <a:lnRef idx="1">
+            <a:schemeClr val="accent1"/>
+          </a:lnRef>
+          <a:fillRef idx="0">
+            <a:schemeClr val="accent1"/>
+          </a:fillRef>
+          <a:effectRef idx="0">
+            <a:schemeClr val="accent1"/>
+          </a:effectRef>
+          <a:fontRef idx="minor">
+            <a:schemeClr val="tx1"/>
+          </a:fontRef>
+        </p:style>
+      </p:cxnSp>
+      <p:sp>
+        <p:nvSpPr>
+          <p:cNvPr id="28" name="TextBox 27">
+            <a:extLst>
+              <a:ext uri="{FF2B5EF4-FFF2-40B4-BE49-F238E27FC236}">
+                <a16:creationId xmlns:a16="http://schemas.microsoft.com/office/drawing/2014/main" id="{4FDF0F6D-9813-B701-89C9-B9954BB2A2E7}"/>
+              </a:ext>
+            </a:extLst>
+          </p:cNvPr>
+          <p:cNvSpPr txBox="1"/>
+          <p:nvPr/>
+        </p:nvSpPr>
+        <p:spPr>
+          <a:xfrm>
+            <a:off x="4509614" y="4229040"/>
+            <a:ext cx="573273" cy="430887"/>
+          </a:xfrm>
+          <a:prstGeom prst="rect">
+            <a:avLst/>
+          </a:prstGeom>
+          <a:noFill/>
+        </p:spPr>
+        <p:txBody>
+          <a:bodyPr wrap="square" rtlCol="0">
+            <a:spAutoFit/>
+          </a:bodyPr>
+          <a:lstStyle/>
+          <a:p>
+            <a:r>
+              <a:rPr lang="en-US" altLang="zh-CN" sz="1100" dirty="0"/>
+              <a:t>JSON </a:t>
+            </a:r>
+          </a:p>
+          <a:p>
+            <a:r>
+              <a:rPr lang="en-US" altLang="zh-CN" sz="1100" dirty="0"/>
+              <a:t>object</a:t>
+            </a:r>
+            <a:endParaRPr lang="zh-CN" altLang="en-US" sz="1100" dirty="0"/>
+          </a:p>
+        </p:txBody>
+      </p:sp>
+      <p:cxnSp>
+        <p:nvCxnSpPr>
+          <p:cNvPr id="31" name="直接箭头连接符 63">
+            <a:extLst>
+              <a:ext uri="{FF2B5EF4-FFF2-40B4-BE49-F238E27FC236}">
+                <a16:creationId xmlns:a16="http://schemas.microsoft.com/office/drawing/2014/main" id="{3AE20E97-875B-4F84-3893-CBD23066FBB9}"/>
+              </a:ext>
+            </a:extLst>
+          </p:cNvPr>
+          <p:cNvCxnSpPr>
+            <a:cxnSpLocks/>
+          </p:cNvCxnSpPr>
+          <p:nvPr/>
+        </p:nvCxnSpPr>
+        <p:spPr>
+          <a:xfrm>
+            <a:off x="5497560" y="4257541"/>
+            <a:ext cx="0" cy="292580"/>
+          </a:xfrm>
+          <a:prstGeom prst="straightConnector1">
+            <a:avLst/>
+          </a:prstGeom>
+          <a:ln w="19050">
+            <a:tailEnd type="arrow"/>
+          </a:ln>
+        </p:spPr>
+        <p:style>
+          <a:lnRef idx="1">
+            <a:schemeClr val="accent1"/>
+          </a:lnRef>
+          <a:fillRef idx="0">
+            <a:schemeClr val="accent1"/>
+          </a:fillRef>
+          <a:effectRef idx="0">
+            <a:schemeClr val="accent1"/>
+          </a:effectRef>
+          <a:fontRef idx="minor">
+            <a:schemeClr val="tx1"/>
+          </a:fontRef>
+        </p:style>
+      </p:cxnSp>
+      <p:sp>
+        <p:nvSpPr>
+          <p:cNvPr id="33" name="TextBox 32">
+            <a:extLst>
+              <a:ext uri="{FF2B5EF4-FFF2-40B4-BE49-F238E27FC236}">
+                <a16:creationId xmlns:a16="http://schemas.microsoft.com/office/drawing/2014/main" id="{0D3A1F93-29EC-4E51-60FC-30A50863F0F8}"/>
+              </a:ext>
+            </a:extLst>
+          </p:cNvPr>
+          <p:cNvSpPr txBox="1"/>
+          <p:nvPr/>
+        </p:nvSpPr>
+        <p:spPr>
+          <a:xfrm>
+            <a:off x="5466663" y="4265258"/>
+            <a:ext cx="1154715" cy="261610"/>
+          </a:xfrm>
+          <a:prstGeom prst="rect">
+            <a:avLst/>
+          </a:prstGeom>
+          <a:noFill/>
+        </p:spPr>
+        <p:txBody>
+          <a:bodyPr wrap="square" rtlCol="0">
+            <a:spAutoFit/>
+          </a:bodyPr>
+          <a:lstStyle/>
+          <a:p>
+            <a:r>
+              <a:rPr lang="en-SG" altLang="zh-CN" sz="1100" dirty="0"/>
+              <a:t>Node data </a:t>
+            </a:r>
+            <a:endParaRPr lang="zh-CN" altLang="en-US" sz="1100" dirty="0"/>
+          </a:p>
+        </p:txBody>
+      </p:sp>
+      <p:cxnSp>
+        <p:nvCxnSpPr>
+          <p:cNvPr id="35" name="Connector: Elbow 34">
+            <a:extLst>
+              <a:ext uri="{FF2B5EF4-FFF2-40B4-BE49-F238E27FC236}">
+                <a16:creationId xmlns:a16="http://schemas.microsoft.com/office/drawing/2014/main" id="{9C48C17B-5D9A-DBF6-D5D1-229843FC7623}"/>
+              </a:ext>
+            </a:extLst>
+          </p:cNvPr>
+          <p:cNvCxnSpPr>
+            <a:cxnSpLocks/>
+            <a:stCxn id="15" idx="2"/>
+          </p:cNvCxnSpPr>
+          <p:nvPr/>
+        </p:nvCxnSpPr>
+        <p:spPr>
+          <a:xfrm rot="5400000" flipH="1" flipV="1">
+            <a:off x="5080846" y="3051774"/>
+            <a:ext cx="719783" cy="3146751"/>
+          </a:xfrm>
+          <a:prstGeom prst="bentConnector4">
+            <a:avLst>
+              <a:gd name="adj1" fmla="val -31760"/>
+              <a:gd name="adj2" fmla="val 100010"/>
+            </a:avLst>
+          </a:prstGeom>
+          <a:ln w="19050">
+            <a:tailEnd type="triangle"/>
+          </a:ln>
+        </p:spPr>
+        <p:style>
+          <a:lnRef idx="1">
+            <a:schemeClr val="accent1"/>
+          </a:lnRef>
+          <a:fillRef idx="0">
+            <a:schemeClr val="accent1"/>
+          </a:fillRef>
+          <a:effectRef idx="0">
+            <a:schemeClr val="accent1"/>
+          </a:effectRef>
+          <a:fontRef idx="minor">
+            <a:schemeClr val="tx1"/>
+          </a:fontRef>
+        </p:style>
+      </p:cxnSp>
+      <p:sp>
+        <p:nvSpPr>
+          <p:cNvPr id="38" name="TextBox 37">
+            <a:extLst>
+              <a:ext uri="{FF2B5EF4-FFF2-40B4-BE49-F238E27FC236}">
+                <a16:creationId xmlns:a16="http://schemas.microsoft.com/office/drawing/2014/main" id="{CF09E31D-4056-D7CA-5199-667BBC59023B}"/>
+              </a:ext>
+            </a:extLst>
+          </p:cNvPr>
+          <p:cNvSpPr txBox="1"/>
+          <p:nvPr/>
+        </p:nvSpPr>
+        <p:spPr>
+          <a:xfrm>
+            <a:off x="3806117" y="5222049"/>
+            <a:ext cx="2472020" cy="430887"/>
+          </a:xfrm>
+          <a:prstGeom prst="rect">
+            <a:avLst/>
+          </a:prstGeom>
+          <a:noFill/>
+        </p:spPr>
+        <p:txBody>
+          <a:bodyPr wrap="square" rtlCol="0">
+            <a:spAutoFit/>
+          </a:bodyPr>
+          <a:lstStyle/>
+          <a:p>
+            <a:r>
+              <a:rPr lang="en-US" altLang="zh-CN" sz="1100" dirty="0"/>
+              <a:t>Update the data fetch request based on the user’s setting  </a:t>
+            </a:r>
+            <a:endParaRPr lang="zh-CN" altLang="en-US" sz="1100" dirty="0"/>
+          </a:p>
+        </p:txBody>
+      </p:sp>
+      <p:sp>
+        <p:nvSpPr>
+          <p:cNvPr id="39" name="TextBox 38">
+            <a:extLst>
+              <a:ext uri="{FF2B5EF4-FFF2-40B4-BE49-F238E27FC236}">
+                <a16:creationId xmlns:a16="http://schemas.microsoft.com/office/drawing/2014/main" id="{F1119EF7-C5E1-A960-ADE1-01ED8C5D943C}"/>
+              </a:ext>
+            </a:extLst>
+          </p:cNvPr>
+          <p:cNvSpPr txBox="1"/>
+          <p:nvPr/>
+        </p:nvSpPr>
+        <p:spPr>
+          <a:xfrm>
+            <a:off x="5071656" y="4872807"/>
+            <a:ext cx="1846652" cy="261610"/>
+          </a:xfrm>
+          <a:prstGeom prst="rect">
+            <a:avLst/>
+          </a:prstGeom>
+          <a:noFill/>
+        </p:spPr>
+        <p:txBody>
+          <a:bodyPr wrap="square" rtlCol="0">
+            <a:spAutoFit/>
+          </a:bodyPr>
+          <a:lstStyle/>
+          <a:p>
+            <a:r>
+              <a:rPr lang="en-SG" altLang="zh-CN" sz="1100" dirty="0"/>
+              <a:t>Create Node, comm-link Json  </a:t>
+            </a:r>
+            <a:endParaRPr lang="zh-CN" altLang="en-US" sz="1100" dirty="0"/>
+          </a:p>
+        </p:txBody>
+      </p:sp>
+      <p:pic>
+        <p:nvPicPr>
+          <p:cNvPr id="42" name="Picture 2" descr="How to Add a Browser Tab Icon to Your Websites! - DEV Community">
+            <a:extLst>
+              <a:ext uri="{FF2B5EF4-FFF2-40B4-BE49-F238E27FC236}">
+                <a16:creationId xmlns:a16="http://schemas.microsoft.com/office/drawing/2014/main" id="{E339F914-E74A-1B10-33C4-48979287B499}"/>
+              </a:ext>
+            </a:extLst>
+          </p:cNvPr>
+          <p:cNvPicPr>
+            <a:picLocks noChangeAspect="1" noChangeArrowheads="1"/>
+          </p:cNvPicPr>
+          <p:nvPr/>
+        </p:nvPicPr>
+        <p:blipFill>
+          <a:blip r:embed="rId3">
+            <a:extLst>
+              <a:ext uri="{28A0092B-C50C-407E-A947-70E740481C1C}">
+                <a14:useLocalDpi xmlns:a14="http://schemas.microsoft.com/office/drawing/2010/main" val="0"/>
+              </a:ext>
+            </a:extLst>
+          </a:blip>
+          <a:srcRect/>
+          <a:stretch>
+            <a:fillRect/>
+          </a:stretch>
+        </p:blipFill>
+        <p:spPr bwMode="auto">
+          <a:xfrm>
+            <a:off x="1751680" y="4024106"/>
+            <a:ext cx="897787" cy="502762"/>
+          </a:xfrm>
+          <a:prstGeom prst="rect">
+            <a:avLst/>
+          </a:prstGeom>
+          <a:noFill/>
+          <a:ln w="19050">
+            <a:solidFill>
+              <a:schemeClr val="tx1"/>
+            </a:solidFill>
+          </a:ln>
+          <a:extLst>
+            <a:ext uri="{909E8E84-426E-40DD-AFC4-6F175D3DCCD1}">
+              <a14:hiddenFill xmlns:a14="http://schemas.microsoft.com/office/drawing/2010/main">
+                <a:solidFill>
+                  <a:srgbClr val="FFFFFF"/>
+                </a:solidFill>
+              </a14:hiddenFill>
+            </a:ext>
+          </a:extLst>
+        </p:spPr>
+      </p:pic>
+      <p:sp>
+        <p:nvSpPr>
+          <p:cNvPr id="43" name="TextBox 42">
+            <a:extLst>
+              <a:ext uri="{FF2B5EF4-FFF2-40B4-BE49-F238E27FC236}">
+                <a16:creationId xmlns:a16="http://schemas.microsoft.com/office/drawing/2014/main" id="{F8457A9C-9AB9-2B24-73C0-F6E6AAF3F34B}"/>
+              </a:ext>
+            </a:extLst>
+          </p:cNvPr>
+          <p:cNvSpPr txBox="1"/>
+          <p:nvPr/>
+        </p:nvSpPr>
+        <p:spPr>
+          <a:xfrm>
+            <a:off x="1704382" y="2432809"/>
+            <a:ext cx="1521833" cy="523220"/>
+          </a:xfrm>
+          <a:prstGeom prst="rect">
+            <a:avLst/>
+          </a:prstGeom>
+          <a:noFill/>
+          <a:ln>
+            <a:noFill/>
+          </a:ln>
+        </p:spPr>
+        <p:style>
+          <a:lnRef idx="2">
+            <a:schemeClr val="dk1"/>
+          </a:lnRef>
+          <a:fillRef idx="1">
+            <a:schemeClr val="lt1"/>
+          </a:fillRef>
+          <a:effectRef idx="0">
+            <a:schemeClr val="dk1"/>
+          </a:effectRef>
+          <a:fontRef idx="minor">
+            <a:schemeClr val="dk1"/>
+          </a:fontRef>
+        </p:style>
+        <p:txBody>
+          <a:bodyPr wrap="square" rtlCol="0">
+            <a:spAutoFit/>
+          </a:bodyPr>
+          <a:lstStyle/>
+          <a:p>
+            <a:pPr marL="0" marR="0" lvl="0" indent="0" algn="l" defTabSz="914400" rtl="0" eaLnBrk="1" fontAlgn="auto" latinLnBrk="0" hangingPunct="1">
+              <a:lnSpc>
+                <a:spcPct val="100000"/>
+              </a:lnSpc>
+              <a:spcBef>
+                <a:spcPts val="0"/>
+              </a:spcBef>
+              <a:spcAft>
+                <a:spcPts val="0"/>
+              </a:spcAft>
+              <a:buClrTx/>
+              <a:buSzTx/>
+              <a:buFontTx/>
+              <a:buNone/>
+              <a:tabLst/>
+              <a:defRPr/>
+            </a:pPr>
+            <a:r>
+              <a:rPr kumimoji="0" lang="en-US" altLang="zh-CN" sz="1400" b="1" i="0" u="none" strike="noStrike" kern="1200" cap="none" spc="0" normalizeH="0" baseline="0" noProof="0" dirty="0">
+                <a:ln>
+                  <a:noFill/>
+                </a:ln>
+                <a:solidFill>
+                  <a:prstClr val="black"/>
+                </a:solidFill>
+                <a:effectLst/>
+                <a:uLnTx/>
+                <a:uFillTx/>
+                <a:latin typeface="Calibri" panose="020F0502020204030204"/>
+                <a:ea typeface="等线" panose="02010600030101010101" pitchFamily="2" charset="-122"/>
+                <a:cs typeface="+mn-cs"/>
+              </a:rPr>
+              <a:t>Users, Security Managers</a:t>
+            </a:r>
+            <a:endParaRPr kumimoji="0" lang="zh-CN" altLang="en-US" sz="1400" b="1" i="0" u="none" strike="noStrike" kern="1200" cap="none" spc="0" normalizeH="0" baseline="0" noProof="0" dirty="0">
+              <a:ln>
+                <a:noFill/>
+              </a:ln>
+              <a:solidFill>
+                <a:prstClr val="black"/>
+              </a:solidFill>
+              <a:effectLst/>
+              <a:uLnTx/>
+              <a:uFillTx/>
+              <a:latin typeface="Calibri" panose="020F0502020204030204"/>
+              <a:ea typeface="等线" panose="02010600030101010101" pitchFamily="2" charset="-122"/>
+              <a:cs typeface="+mn-cs"/>
+            </a:endParaRPr>
+          </a:p>
+        </p:txBody>
+      </p:sp>
+      <p:cxnSp>
+        <p:nvCxnSpPr>
+          <p:cNvPr id="44" name="直接箭头连接符 100">
+            <a:extLst>
+              <a:ext uri="{FF2B5EF4-FFF2-40B4-BE49-F238E27FC236}">
+                <a16:creationId xmlns:a16="http://schemas.microsoft.com/office/drawing/2014/main" id="{BF8E39C6-0DB5-EF8D-941E-28D23BEE2B2F}"/>
+              </a:ext>
+            </a:extLst>
+          </p:cNvPr>
+          <p:cNvCxnSpPr>
+            <a:cxnSpLocks/>
+            <a:stCxn id="6" idx="2"/>
+          </p:cNvCxnSpPr>
+          <p:nvPr/>
+        </p:nvCxnSpPr>
+        <p:spPr>
+          <a:xfrm>
+            <a:off x="2186927" y="3684129"/>
+            <a:ext cx="0" cy="339977"/>
+          </a:xfrm>
+          <a:prstGeom prst="straightConnector1">
+            <a:avLst/>
+          </a:prstGeom>
+          <a:ln w="19050">
+            <a:tailEnd type="arrow"/>
+          </a:ln>
+        </p:spPr>
+        <p:style>
+          <a:lnRef idx="1">
+            <a:schemeClr val="accent1"/>
+          </a:lnRef>
+          <a:fillRef idx="0">
+            <a:schemeClr val="accent1"/>
+          </a:fillRef>
+          <a:effectRef idx="0">
+            <a:schemeClr val="accent1"/>
+          </a:effectRef>
+          <a:fontRef idx="minor">
+            <a:schemeClr val="tx1"/>
+          </a:fontRef>
+        </p:style>
+      </p:cxnSp>
+      <p:cxnSp>
+        <p:nvCxnSpPr>
+          <p:cNvPr id="47" name="Connector: Elbow 46">
+            <a:extLst>
+              <a:ext uri="{FF2B5EF4-FFF2-40B4-BE49-F238E27FC236}">
+                <a16:creationId xmlns:a16="http://schemas.microsoft.com/office/drawing/2014/main" id="{C8959829-912B-760B-FFDE-D516B1158682}"/>
+              </a:ext>
+            </a:extLst>
+          </p:cNvPr>
+          <p:cNvCxnSpPr>
+            <a:cxnSpLocks/>
+            <a:stCxn id="42" idx="2"/>
+            <a:endCxn id="15" idx="1"/>
+          </p:cNvCxnSpPr>
+          <p:nvPr/>
+        </p:nvCxnSpPr>
+        <p:spPr>
+          <a:xfrm rot="16200000" flipH="1">
+            <a:off x="2613581" y="4113860"/>
+            <a:ext cx="235824" cy="1061839"/>
+          </a:xfrm>
+          <a:prstGeom prst="bentConnector2">
+            <a:avLst/>
+          </a:prstGeom>
+          <a:ln w="19050">
+            <a:tailEnd type="triangle"/>
+          </a:ln>
+        </p:spPr>
+        <p:style>
+          <a:lnRef idx="1">
+            <a:schemeClr val="accent1"/>
+          </a:lnRef>
+          <a:fillRef idx="0">
+            <a:schemeClr val="accent1"/>
+          </a:fillRef>
+          <a:effectRef idx="0">
+            <a:schemeClr val="accent1"/>
+          </a:effectRef>
+          <a:fontRef idx="minor">
+            <a:schemeClr val="tx1"/>
+          </a:fontRef>
+        </p:style>
+      </p:cxnSp>
+      <p:sp>
+        <p:nvSpPr>
+          <p:cNvPr id="50" name="TextBox 49">
+            <a:extLst>
+              <a:ext uri="{FF2B5EF4-FFF2-40B4-BE49-F238E27FC236}">
+                <a16:creationId xmlns:a16="http://schemas.microsoft.com/office/drawing/2014/main" id="{5222BEB2-9764-1E7C-15DB-C36108B6E7C6}"/>
+              </a:ext>
+            </a:extLst>
+          </p:cNvPr>
+          <p:cNvSpPr txBox="1"/>
+          <p:nvPr/>
+        </p:nvSpPr>
+        <p:spPr>
+          <a:xfrm>
+            <a:off x="2117124" y="4774997"/>
+            <a:ext cx="1008112" cy="261610"/>
+          </a:xfrm>
+          <a:prstGeom prst="rect">
+            <a:avLst/>
+          </a:prstGeom>
+          <a:noFill/>
+        </p:spPr>
+        <p:txBody>
+          <a:bodyPr wrap="square" rtlCol="0">
+            <a:spAutoFit/>
+          </a:bodyPr>
+          <a:lstStyle/>
+          <a:p>
+            <a:r>
+              <a:rPr lang="en-US" altLang="zh-CN" sz="1100" dirty="0"/>
+              <a:t>User’s setting </a:t>
+            </a:r>
+            <a:endParaRPr lang="zh-CN" altLang="en-US" sz="1100" dirty="0"/>
+          </a:p>
+        </p:txBody>
+      </p:sp>
+      <p:sp>
+        <p:nvSpPr>
+          <p:cNvPr id="51" name="流程图: 磁盘 5">
+            <a:extLst>
+              <a:ext uri="{FF2B5EF4-FFF2-40B4-BE49-F238E27FC236}">
+                <a16:creationId xmlns:a16="http://schemas.microsoft.com/office/drawing/2014/main" id="{6AE3E959-2BCF-BB83-0C6A-2C875A4747D2}"/>
+              </a:ext>
+            </a:extLst>
+          </p:cNvPr>
+          <p:cNvSpPr/>
+          <p:nvPr/>
+        </p:nvSpPr>
+        <p:spPr>
+          <a:xfrm>
+            <a:off x="7777799" y="5076872"/>
+            <a:ext cx="1080120" cy="576064"/>
+          </a:xfrm>
+          <a:prstGeom prst="flowChartMagneticDisk">
+            <a:avLst/>
+          </a:prstGeom>
+        </p:spPr>
+        <p:style>
+          <a:lnRef idx="2">
+            <a:schemeClr val="accent1">
+              <a:shade val="50000"/>
+            </a:schemeClr>
+          </a:lnRef>
+          <a:fillRef idx="1">
+            <a:schemeClr val="accent1"/>
+          </a:fillRef>
+          <a:effectRef idx="0">
+            <a:schemeClr val="accent1"/>
+          </a:effectRef>
+          <a:fontRef idx="minor">
+            <a:schemeClr val="lt1"/>
+          </a:fontRef>
+        </p:style>
+        <p:txBody>
+          <a:bodyPr rtlCol="0" anchor="ctr"/>
+          <a:lstStyle/>
+          <a:p>
+            <a:pPr algn="ctr"/>
+            <a:r>
+              <a:rPr lang="en-US" altLang="zh-CN" b="1" dirty="0"/>
+              <a:t>Database</a:t>
+            </a:r>
+            <a:endParaRPr lang="zh-CN" altLang="en-US" b="1" dirty="0"/>
+          </a:p>
+        </p:txBody>
+      </p:sp>
+      <p:sp>
+        <p:nvSpPr>
+          <p:cNvPr id="54" name="Rectangle 53">
+            <a:extLst>
+              <a:ext uri="{FF2B5EF4-FFF2-40B4-BE49-F238E27FC236}">
+                <a16:creationId xmlns:a16="http://schemas.microsoft.com/office/drawing/2014/main" id="{819D7D31-F580-A1DE-3A9C-2E47C9FAF2B4}"/>
+              </a:ext>
+            </a:extLst>
+          </p:cNvPr>
+          <p:cNvSpPr/>
+          <p:nvPr/>
+        </p:nvSpPr>
+        <p:spPr>
+          <a:xfrm>
+            <a:off x="7545497" y="2754195"/>
+            <a:ext cx="1282496" cy="558927"/>
+          </a:xfrm>
+          <a:prstGeom prst="rect">
+            <a:avLst/>
+          </a:prstGeom>
+          <a:solidFill>
+            <a:srgbClr val="7030A0"/>
+          </a:solidFill>
+        </p:spPr>
+        <p:style>
+          <a:lnRef idx="2">
+            <a:schemeClr val="accent1">
+              <a:shade val="50000"/>
+            </a:schemeClr>
+          </a:lnRef>
+          <a:fillRef idx="1">
+            <a:schemeClr val="accent1"/>
+          </a:fillRef>
+          <a:effectRef idx="0">
+            <a:schemeClr val="accent1"/>
+          </a:effectRef>
+          <a:fontRef idx="minor">
+            <a:schemeClr val="lt1"/>
+          </a:fontRef>
+        </p:style>
+        <p:txBody>
+          <a:bodyPr rtlCol="0" anchor="ctr"/>
+          <a:lstStyle/>
+          <a:p>
+            <a:r>
+              <a:rPr lang="en-US" sz="1100" b="1" dirty="0"/>
+              <a:t>Random test generate module </a:t>
+            </a:r>
+            <a:endParaRPr lang="en-SG" sz="1100" b="1" dirty="0"/>
+          </a:p>
+        </p:txBody>
+      </p:sp>
+      <p:pic>
+        <p:nvPicPr>
+          <p:cNvPr id="55" name="Picture 8" descr="Server Icon Vector Isolated on White Background, Server Sign , L Stock  Vector - Illustration of symbol, computer: 133799784">
+            <a:extLst>
+              <a:ext uri="{FF2B5EF4-FFF2-40B4-BE49-F238E27FC236}">
+                <a16:creationId xmlns:a16="http://schemas.microsoft.com/office/drawing/2014/main" id="{BA3C89D6-3697-19E3-DB1D-A522B7C299D8}"/>
+              </a:ext>
+            </a:extLst>
+          </p:cNvPr>
+          <p:cNvPicPr>
+            <a:picLocks noChangeAspect="1" noChangeArrowheads="1"/>
+          </p:cNvPicPr>
+          <p:nvPr/>
+        </p:nvPicPr>
+        <p:blipFill>
+          <a:blip r:embed="rId4">
+            <a:extLst>
+              <a:ext uri="{28A0092B-C50C-407E-A947-70E740481C1C}">
+                <a14:useLocalDpi xmlns:a14="http://schemas.microsoft.com/office/drawing/2010/main" val="0"/>
+              </a:ext>
+            </a:extLst>
+          </a:blip>
+          <a:srcRect/>
+          <a:stretch>
+            <a:fillRect/>
+          </a:stretch>
+        </p:blipFill>
+        <p:spPr bwMode="auto">
+          <a:xfrm>
+            <a:off x="7496652" y="2003424"/>
+            <a:ext cx="633261" cy="633261"/>
+          </a:xfrm>
+          <a:prstGeom prst="rect">
+            <a:avLst/>
+          </a:prstGeom>
+          <a:noFill/>
+          <a:extLst>
+            <a:ext uri="{909E8E84-426E-40DD-AFC4-6F175D3DCCD1}">
+              <a14:hiddenFill xmlns:a14="http://schemas.microsoft.com/office/drawing/2010/main">
+                <a:solidFill>
+                  <a:srgbClr val="FFFFFF"/>
+                </a:solidFill>
+              </a14:hiddenFill>
+            </a:ext>
+          </a:extLst>
+        </p:spPr>
+      </p:pic>
+      <p:cxnSp>
+        <p:nvCxnSpPr>
+          <p:cNvPr id="56" name="Connector: Elbow 55">
+            <a:extLst>
+              <a:ext uri="{FF2B5EF4-FFF2-40B4-BE49-F238E27FC236}">
+                <a16:creationId xmlns:a16="http://schemas.microsoft.com/office/drawing/2014/main" id="{64D4754B-D5BF-CC88-6B57-36CD1C4410D5}"/>
+              </a:ext>
+            </a:extLst>
+          </p:cNvPr>
+          <p:cNvCxnSpPr>
+            <a:cxnSpLocks/>
+            <a:stCxn id="51" idx="2"/>
+            <a:endCxn id="24" idx="3"/>
+          </p:cNvCxnSpPr>
+          <p:nvPr/>
+        </p:nvCxnSpPr>
+        <p:spPr>
+          <a:xfrm rot="10800000">
+            <a:off x="7092821" y="4078816"/>
+            <a:ext cx="684979" cy="1286088"/>
+          </a:xfrm>
+          <a:prstGeom prst="bentConnector3">
+            <a:avLst>
+              <a:gd name="adj1" fmla="val 50000"/>
+            </a:avLst>
+          </a:prstGeom>
+          <a:ln w="19050">
+            <a:tailEnd type="triangle"/>
+          </a:ln>
+        </p:spPr>
+        <p:style>
+          <a:lnRef idx="1">
+            <a:schemeClr val="accent1"/>
+          </a:lnRef>
+          <a:fillRef idx="0">
+            <a:schemeClr val="accent1"/>
+          </a:fillRef>
+          <a:effectRef idx="0">
+            <a:schemeClr val="accent1"/>
+          </a:effectRef>
+          <a:fontRef idx="minor">
+            <a:schemeClr val="tx1"/>
+          </a:fontRef>
+        </p:style>
+      </p:cxnSp>
+      <p:pic>
+        <p:nvPicPr>
+          <p:cNvPr id="59" name="Picture 8" descr="Server Icon Vector Isolated on White Background, Server Sign , L Stock  Vector - Illustration of symbol, computer: 133799784">
+            <a:extLst>
+              <a:ext uri="{FF2B5EF4-FFF2-40B4-BE49-F238E27FC236}">
+                <a16:creationId xmlns:a16="http://schemas.microsoft.com/office/drawing/2014/main" id="{6D78225D-CB50-D26D-FD66-E05B25B6D3FA}"/>
+              </a:ext>
+            </a:extLst>
+          </p:cNvPr>
+          <p:cNvPicPr>
+            <a:picLocks noChangeAspect="1" noChangeArrowheads="1"/>
+          </p:cNvPicPr>
+          <p:nvPr/>
+        </p:nvPicPr>
+        <p:blipFill>
+          <a:blip r:embed="rId4">
+            <a:extLst>
+              <a:ext uri="{28A0092B-C50C-407E-A947-70E740481C1C}">
+                <a14:useLocalDpi xmlns:a14="http://schemas.microsoft.com/office/drawing/2010/main" val="0"/>
+              </a:ext>
+            </a:extLst>
+          </a:blip>
+          <a:srcRect/>
+          <a:stretch>
+            <a:fillRect/>
+          </a:stretch>
+        </p:blipFill>
+        <p:spPr bwMode="auto">
+          <a:xfrm>
+            <a:off x="8223556" y="2025923"/>
+            <a:ext cx="621280" cy="621280"/>
+          </a:xfrm>
+          <a:prstGeom prst="rect">
+            <a:avLst/>
+          </a:prstGeom>
+          <a:noFill/>
+          <a:extLst>
+            <a:ext uri="{909E8E84-426E-40DD-AFC4-6F175D3DCCD1}">
+              <a14:hiddenFill xmlns:a14="http://schemas.microsoft.com/office/drawing/2010/main">
+                <a:solidFill>
+                  <a:srgbClr val="FFFFFF"/>
+                </a:solidFill>
+              </a14:hiddenFill>
+            </a:ext>
+          </a:extLst>
+        </p:spPr>
+      </p:pic>
+      <p:sp>
+        <p:nvSpPr>
+          <p:cNvPr id="60" name="Rectangle 59">
+            <a:extLst>
+              <a:ext uri="{FF2B5EF4-FFF2-40B4-BE49-F238E27FC236}">
+                <a16:creationId xmlns:a16="http://schemas.microsoft.com/office/drawing/2014/main" id="{B2CBE0AB-E07D-6DDA-58F2-5EF91921AE00}"/>
+              </a:ext>
+            </a:extLst>
+          </p:cNvPr>
+          <p:cNvSpPr/>
+          <p:nvPr/>
+        </p:nvSpPr>
+        <p:spPr>
+          <a:xfrm>
+            <a:off x="7856507" y="4210841"/>
+            <a:ext cx="1435776" cy="432150"/>
+          </a:xfrm>
+          <a:prstGeom prst="rect">
+            <a:avLst/>
+          </a:prstGeom>
+          <a:solidFill>
+            <a:schemeClr val="accent6">
+              <a:lumMod val="75000"/>
+            </a:schemeClr>
+          </a:solidFill>
+        </p:spPr>
+        <p:style>
+          <a:lnRef idx="2">
+            <a:schemeClr val="accent1">
+              <a:shade val="50000"/>
+            </a:schemeClr>
+          </a:lnRef>
+          <a:fillRef idx="1">
+            <a:schemeClr val="accent1"/>
+          </a:fillRef>
+          <a:effectRef idx="0">
+            <a:schemeClr val="accent1"/>
+          </a:effectRef>
+          <a:fontRef idx="minor">
+            <a:schemeClr val="lt1"/>
+          </a:fontRef>
+        </p:style>
+        <p:txBody>
+          <a:bodyPr rtlCol="0" anchor="ctr"/>
+          <a:lstStyle/>
+          <a:p>
+            <a:r>
+              <a:rPr lang="en-US" altLang="zh-CN" sz="1400" dirty="0"/>
+              <a:t>Data Collection module </a:t>
+            </a:r>
+            <a:endParaRPr lang="zh-CN" altLang="en-US" sz="1400" dirty="0"/>
+          </a:p>
+        </p:txBody>
+      </p:sp>
+      <p:cxnSp>
+        <p:nvCxnSpPr>
+          <p:cNvPr id="62" name="直接箭头连接符 63">
+            <a:extLst>
+              <a:ext uri="{FF2B5EF4-FFF2-40B4-BE49-F238E27FC236}">
+                <a16:creationId xmlns:a16="http://schemas.microsoft.com/office/drawing/2014/main" id="{53F7CBED-FC87-E7BC-FE2F-61898A872A9F}"/>
+              </a:ext>
+            </a:extLst>
+          </p:cNvPr>
+          <p:cNvCxnSpPr>
+            <a:cxnSpLocks/>
+          </p:cNvCxnSpPr>
+          <p:nvPr/>
+        </p:nvCxnSpPr>
+        <p:spPr>
+          <a:xfrm>
+            <a:off x="8295566" y="3684129"/>
+            <a:ext cx="0" cy="526712"/>
+          </a:xfrm>
+          <a:prstGeom prst="straightConnector1">
+            <a:avLst/>
+          </a:prstGeom>
+          <a:ln w="19050">
+            <a:tailEnd type="arrow"/>
+          </a:ln>
+        </p:spPr>
+        <p:style>
+          <a:lnRef idx="1">
+            <a:schemeClr val="accent1"/>
+          </a:lnRef>
+          <a:fillRef idx="0">
+            <a:schemeClr val="accent1"/>
+          </a:fillRef>
+          <a:effectRef idx="0">
+            <a:schemeClr val="accent1"/>
+          </a:effectRef>
+          <a:fontRef idx="minor">
+            <a:schemeClr val="tx1"/>
+          </a:fontRef>
+        </p:style>
+      </p:cxnSp>
+      <p:cxnSp>
+        <p:nvCxnSpPr>
+          <p:cNvPr id="64" name="直接箭头连接符 63">
+            <a:extLst>
+              <a:ext uri="{FF2B5EF4-FFF2-40B4-BE49-F238E27FC236}">
+                <a16:creationId xmlns:a16="http://schemas.microsoft.com/office/drawing/2014/main" id="{6FD4CE43-101B-679F-8938-B7FE4C4C4EE1}"/>
+              </a:ext>
+            </a:extLst>
+          </p:cNvPr>
+          <p:cNvCxnSpPr>
+            <a:cxnSpLocks/>
+          </p:cNvCxnSpPr>
+          <p:nvPr/>
+        </p:nvCxnSpPr>
+        <p:spPr>
+          <a:xfrm>
+            <a:off x="8295566" y="4659927"/>
+            <a:ext cx="0" cy="452297"/>
+          </a:xfrm>
+          <a:prstGeom prst="straightConnector1">
+            <a:avLst/>
+          </a:prstGeom>
+          <a:ln w="19050">
+            <a:tailEnd type="arrow"/>
+          </a:ln>
+        </p:spPr>
+        <p:style>
+          <a:lnRef idx="1">
+            <a:schemeClr val="accent1"/>
+          </a:lnRef>
+          <a:fillRef idx="0">
+            <a:schemeClr val="accent1"/>
+          </a:fillRef>
+          <a:effectRef idx="0">
+            <a:schemeClr val="accent1"/>
+          </a:effectRef>
+          <a:fontRef idx="minor">
+            <a:schemeClr val="tx1"/>
+          </a:fontRef>
+        </p:style>
+      </p:cxnSp>
+      <p:sp>
+        <p:nvSpPr>
+          <p:cNvPr id="66" name="TextBox 65">
+            <a:extLst>
+              <a:ext uri="{FF2B5EF4-FFF2-40B4-BE49-F238E27FC236}">
+                <a16:creationId xmlns:a16="http://schemas.microsoft.com/office/drawing/2014/main" id="{0D4A9685-670C-433A-8D2B-3ADBF8212E26}"/>
+              </a:ext>
+            </a:extLst>
+          </p:cNvPr>
+          <p:cNvSpPr txBox="1"/>
+          <p:nvPr/>
+        </p:nvSpPr>
+        <p:spPr>
+          <a:xfrm>
+            <a:off x="7427220" y="1776682"/>
+            <a:ext cx="1736691" cy="307777"/>
+          </a:xfrm>
+          <a:prstGeom prst="rect">
+            <a:avLst/>
+          </a:prstGeom>
+          <a:noFill/>
+          <a:ln>
+            <a:noFill/>
+          </a:ln>
+        </p:spPr>
+        <p:style>
+          <a:lnRef idx="2">
+            <a:schemeClr val="dk1"/>
+          </a:lnRef>
+          <a:fillRef idx="1">
+            <a:schemeClr val="lt1"/>
+          </a:fillRef>
+          <a:effectRef idx="0">
+            <a:schemeClr val="dk1"/>
+          </a:effectRef>
+          <a:fontRef idx="minor">
+            <a:schemeClr val="dk1"/>
+          </a:fontRef>
+        </p:style>
+        <p:txBody>
+          <a:bodyPr wrap="square" rtlCol="0">
+            <a:spAutoFit/>
+          </a:bodyPr>
+          <a:lstStyle/>
+          <a:p>
+            <a:pPr marL="0" marR="0" lvl="0" indent="0" algn="l" defTabSz="914400" rtl="0" eaLnBrk="1" fontAlgn="auto" latinLnBrk="0" hangingPunct="1">
+              <a:lnSpc>
+                <a:spcPct val="100000"/>
+              </a:lnSpc>
+              <a:spcBef>
+                <a:spcPts val="0"/>
+              </a:spcBef>
+              <a:spcAft>
+                <a:spcPts val="0"/>
+              </a:spcAft>
+              <a:buClrTx/>
+              <a:buSzTx/>
+              <a:buFontTx/>
+              <a:buNone/>
+              <a:tabLst/>
+              <a:defRPr/>
+            </a:pPr>
+            <a:r>
+              <a:rPr kumimoji="0" lang="en-US" altLang="zh-CN" sz="1400" b="1" i="0" u="none" strike="noStrike" kern="1200" cap="none" spc="0" normalizeH="0" baseline="0" noProof="0" dirty="0">
+                <a:ln>
+                  <a:noFill/>
+                </a:ln>
+                <a:solidFill>
+                  <a:prstClr val="black"/>
+                </a:solidFill>
+                <a:effectLst/>
+                <a:uLnTx/>
+                <a:uFillTx/>
+                <a:latin typeface="Calibri" panose="020F0502020204030204"/>
+                <a:ea typeface="等线" panose="02010600030101010101" pitchFamily="2" charset="-122"/>
+                <a:cs typeface="+mn-cs"/>
+              </a:rPr>
+              <a:t>Monitored devices </a:t>
+            </a:r>
+            <a:endParaRPr kumimoji="0" lang="zh-CN" altLang="en-US" sz="1400" b="1" i="0" u="none" strike="noStrike" kern="1200" cap="none" spc="0" normalizeH="0" baseline="0" noProof="0" dirty="0">
+              <a:ln>
+                <a:noFill/>
+              </a:ln>
+              <a:solidFill>
+                <a:prstClr val="black"/>
+              </a:solidFill>
+              <a:effectLst/>
+              <a:uLnTx/>
+              <a:uFillTx/>
+              <a:latin typeface="Calibri" panose="020F0502020204030204"/>
+              <a:ea typeface="等线" panose="02010600030101010101" pitchFamily="2" charset="-122"/>
+              <a:cs typeface="+mn-cs"/>
+            </a:endParaRPr>
+          </a:p>
+        </p:txBody>
+      </p:sp>
+    </p:spTree>
+    <p:extLst>
+      <p:ext uri="{BB962C8B-B14F-4D97-AF65-F5344CB8AC3E}">
+        <p14:creationId xmlns:p14="http://schemas.microsoft.com/office/powerpoint/2010/main" val="3223343513"/>
+      </p:ext>
+    </p:extLst>
+  </p:cSld>
+  <p:clrMapOvr>
+    <a:masterClrMapping/>
+  </p:clrMapOvr>
+</p:sld>
+</file>
+
 <file path=ppt/theme/theme1.xml><?xml version="1.0" encoding="utf-8"?>
 <a:theme xmlns:a="http://schemas.openxmlformats.org/drawingml/2006/main" name="1_Office Theme">
   <a:themeElements>

</xml_diff>

<commit_message>
Added the lib __init__.py and update the program setup section in the read me file.
</commit_message>
<xml_diff>
--- a/doc/designDoc.pptx
+++ b/doc/designDoc.pptx
@@ -7,6 +7,8 @@
   <p:sldIdLst>
     <p:sldId id="259" r:id="rId2"/>
     <p:sldId id="260" r:id="rId3"/>
+    <p:sldId id="261" r:id="rId4"/>
+    <p:sldId id="262" r:id="rId5"/>
   </p:sldIdLst>
   <p:sldSz cx="12192000" cy="6858000"/>
   <p:notesSz cx="6858000" cy="9144000"/>
@@ -7894,6 +7896,186 @@
 </p:sld>
 </file>
 
+<file path=ppt/slides/slide3.xml><?xml version="1.0" encoding="utf-8"?>
+<p:sld xmlns:a="http://schemas.openxmlformats.org/drawingml/2006/main" xmlns:r="http://schemas.openxmlformats.org/officeDocument/2006/relationships" xmlns:p="http://schemas.openxmlformats.org/presentationml/2006/main">
+  <p:cSld>
+    <p:spTree>
+      <p:nvGrpSpPr>
+        <p:cNvPr id="1" name=""/>
+        <p:cNvGrpSpPr/>
+        <p:nvPr/>
+      </p:nvGrpSpPr>
+      <p:grpSpPr>
+        <a:xfrm>
+          <a:off x="0" y="0"/>
+          <a:ext cx="0" cy="0"/>
+          <a:chOff x="0" y="0"/>
+          <a:chExt cx="0" cy="0"/>
+        </a:xfrm>
+      </p:grpSpPr>
+      <p:pic>
+        <p:nvPicPr>
+          <p:cNvPr id="5" name="Picture 4">
+            <a:extLst>
+              <a:ext uri="{FF2B5EF4-FFF2-40B4-BE49-F238E27FC236}">
+                <a16:creationId xmlns:a16="http://schemas.microsoft.com/office/drawing/2014/main" id="{ECE68E4A-31CE-A999-746C-FC861225695E}"/>
+              </a:ext>
+            </a:extLst>
+          </p:cNvPr>
+          <p:cNvPicPr>
+            <a:picLocks noChangeAspect="1"/>
+          </p:cNvPicPr>
+          <p:nvPr/>
+        </p:nvPicPr>
+        <p:blipFill>
+          <a:blip r:embed="rId2"/>
+          <a:stretch>
+            <a:fillRect/>
+          </a:stretch>
+        </p:blipFill>
+        <p:spPr>
+          <a:xfrm>
+            <a:off x="1119881" y="3504857"/>
+            <a:ext cx="9390476" cy="2676190"/>
+          </a:xfrm>
+          <a:prstGeom prst="rect">
+            <a:avLst/>
+          </a:prstGeom>
+        </p:spPr>
+      </p:pic>
+      <p:pic>
+        <p:nvPicPr>
+          <p:cNvPr id="7" name="Picture 6">
+            <a:extLst>
+              <a:ext uri="{FF2B5EF4-FFF2-40B4-BE49-F238E27FC236}">
+                <a16:creationId xmlns:a16="http://schemas.microsoft.com/office/drawing/2014/main" id="{C53844E6-2E03-277F-5705-C68704850A19}"/>
+              </a:ext>
+            </a:extLst>
+          </p:cNvPr>
+          <p:cNvPicPr>
+            <a:picLocks noChangeAspect="1"/>
+          </p:cNvPicPr>
+          <p:nvPr/>
+        </p:nvPicPr>
+        <p:blipFill>
+          <a:blip r:embed="rId3"/>
+          <a:stretch>
+            <a:fillRect/>
+          </a:stretch>
+        </p:blipFill>
+        <p:spPr>
+          <a:xfrm>
+            <a:off x="1119881" y="676619"/>
+            <a:ext cx="9447619" cy="2752381"/>
+          </a:xfrm>
+          <a:prstGeom prst="rect">
+            <a:avLst/>
+          </a:prstGeom>
+        </p:spPr>
+      </p:pic>
+    </p:spTree>
+    <p:extLst>
+      <p:ext uri="{BB962C8B-B14F-4D97-AF65-F5344CB8AC3E}">
+        <p14:creationId xmlns:p14="http://schemas.microsoft.com/office/powerpoint/2010/main" val="2292832995"/>
+      </p:ext>
+    </p:extLst>
+  </p:cSld>
+  <p:clrMapOvr>
+    <a:masterClrMapping/>
+  </p:clrMapOvr>
+</p:sld>
+</file>
+
+<file path=ppt/slides/slide4.xml><?xml version="1.0" encoding="utf-8"?>
+<p:sld xmlns:a="http://schemas.openxmlformats.org/drawingml/2006/main" xmlns:r="http://schemas.openxmlformats.org/officeDocument/2006/relationships" xmlns:p="http://schemas.openxmlformats.org/presentationml/2006/main">
+  <p:cSld>
+    <p:spTree>
+      <p:nvGrpSpPr>
+        <p:cNvPr id="1" name=""/>
+        <p:cNvGrpSpPr/>
+        <p:nvPr/>
+      </p:nvGrpSpPr>
+      <p:grpSpPr>
+        <a:xfrm>
+          <a:off x="0" y="0"/>
+          <a:ext cx="0" cy="0"/>
+          <a:chOff x="0" y="0"/>
+          <a:chExt cx="0" cy="0"/>
+        </a:xfrm>
+      </p:grpSpPr>
+      <p:pic>
+        <p:nvPicPr>
+          <p:cNvPr id="5" name="Picture 4">
+            <a:extLst>
+              <a:ext uri="{FF2B5EF4-FFF2-40B4-BE49-F238E27FC236}">
+                <a16:creationId xmlns:a16="http://schemas.microsoft.com/office/drawing/2014/main" id="{962B3431-ED1C-2C8D-079A-BEBC908A916D}"/>
+              </a:ext>
+            </a:extLst>
+          </p:cNvPr>
+          <p:cNvPicPr>
+            <a:picLocks noChangeAspect="1"/>
+          </p:cNvPicPr>
+          <p:nvPr/>
+        </p:nvPicPr>
+        <p:blipFill>
+          <a:blip r:embed="rId2"/>
+          <a:stretch>
+            <a:fillRect/>
+          </a:stretch>
+        </p:blipFill>
+        <p:spPr>
+          <a:xfrm>
+            <a:off x="1253319" y="392434"/>
+            <a:ext cx="8933098" cy="3160804"/>
+          </a:xfrm>
+          <a:prstGeom prst="rect">
+            <a:avLst/>
+          </a:prstGeom>
+        </p:spPr>
+      </p:pic>
+      <p:pic>
+        <p:nvPicPr>
+          <p:cNvPr id="7" name="Picture 6">
+            <a:extLst>
+              <a:ext uri="{FF2B5EF4-FFF2-40B4-BE49-F238E27FC236}">
+                <a16:creationId xmlns:a16="http://schemas.microsoft.com/office/drawing/2014/main" id="{E3BC67BD-8246-3E2A-42C6-8428FC74CBDD}"/>
+              </a:ext>
+            </a:extLst>
+          </p:cNvPr>
+          <p:cNvPicPr>
+            <a:picLocks noChangeAspect="1"/>
+          </p:cNvPicPr>
+          <p:nvPr/>
+        </p:nvPicPr>
+        <p:blipFill>
+          <a:blip r:embed="rId3"/>
+          <a:stretch>
+            <a:fillRect/>
+          </a:stretch>
+        </p:blipFill>
+        <p:spPr>
+          <a:xfrm>
+            <a:off x="1189311" y="3429000"/>
+            <a:ext cx="8933098" cy="3118496"/>
+          </a:xfrm>
+          <a:prstGeom prst="rect">
+            <a:avLst/>
+          </a:prstGeom>
+        </p:spPr>
+      </p:pic>
+    </p:spTree>
+    <p:extLst>
+      <p:ext uri="{BB962C8B-B14F-4D97-AF65-F5344CB8AC3E}">
+        <p14:creationId xmlns:p14="http://schemas.microsoft.com/office/powerpoint/2010/main" val="4201928352"/>
+      </p:ext>
+    </p:extLst>
+  </p:cSld>
+  <p:clrMapOvr>
+    <a:masterClrMapping/>
+  </p:clrMapOvr>
+</p:sld>
+</file>
+
 <file path=ppt/theme/theme1.xml><?xml version="1.0" encoding="utf-8"?>
 <a:theme xmlns:a="http://schemas.openxmlformats.org/drawingml/2006/main" name="1_Office Theme">
   <a:themeElements>

</xml_diff>